<commit_message>
2 lec example fix
</commit_message>
<xml_diff>
--- a/2. Графическая реализация алгоритмов/2. Графическая реализация алгоритмов.pptx
+++ b/2. Графическая реализация алгоритмов/2. Графическая реализация алгоритмов.pptx
@@ -207,7 +207,7 @@
           <a:p>
             <a:fld id="{036B47B5-EF1D-41BD-9CC3-7AD4E8DDF9BA}" type="datetimeFigureOut">
               <a:rPr lang="ru-RU" smtClean="0"/>
-              <a:t>06.02.2022</a:t>
+              <a:t>07.02.2022</a:t>
             </a:fld>
             <a:endParaRPr lang="ru-RU"/>
           </a:p>
@@ -532,7 +532,7 @@
           <a:noFill/>
           <a:extLst>
             <a:ext uri="{909E8E84-426E-40dd-AFC4-6F175D3DCCD1}">
-              <a14:hiddenFill xmlns="" xmlns:a14="http://schemas.microsoft.com/office/drawing/2010/main">
+              <a14:hiddenFill xmlns:a14="http://schemas.microsoft.com/office/drawing/2010/main" xmlns="">
                 <a:solidFill>
                   <a:srgbClr val="FFFFFF"/>
                 </a:solidFill>
@@ -591,7 +591,7 @@
             </a:ln>
             <a:extLst>
               <a:ext uri="{91240B29-F687-4f45-9708-019B960494DF}">
-                <a14:hiddenLine xmlns="" xmlns:a14="http://schemas.microsoft.com/office/drawing/2010/main" w="9525">
+                <a14:hiddenLine xmlns:a14="http://schemas.microsoft.com/office/drawing/2010/main" xmlns="" w="9525">
                   <a:solidFill>
                     <a:srgbClr val="000000"/>
                   </a:solidFill>
@@ -681,7 +681,7 @@
             </a:ln>
             <a:extLst>
               <a:ext uri="{91240B29-F687-4f45-9708-019B960494DF}">
-                <a14:hiddenLine xmlns="" xmlns:a14="http://schemas.microsoft.com/office/drawing/2010/main" w="9525">
+                <a14:hiddenLine xmlns:a14="http://schemas.microsoft.com/office/drawing/2010/main" xmlns="" w="9525">
                   <a:solidFill>
                     <a:srgbClr val="000000"/>
                   </a:solidFill>
@@ -771,7 +771,7 @@
             </a:ln>
             <a:extLst>
               <a:ext uri="{91240B29-F687-4f45-9708-019B960494DF}">
-                <a14:hiddenLine xmlns="" xmlns:a14="http://schemas.microsoft.com/office/drawing/2010/main" w="9525">
+                <a14:hiddenLine xmlns:a14="http://schemas.microsoft.com/office/drawing/2010/main" xmlns="" w="9525">
                   <a:solidFill>
                     <a:srgbClr val="000000"/>
                   </a:solidFill>
@@ -805,7 +805,7 @@
             </a:ln>
             <a:extLst>
               <a:ext uri="{91240B29-F687-4f45-9708-019B960494DF}">
-                <a14:hiddenLine xmlns="" xmlns:a14="http://schemas.microsoft.com/office/drawing/2010/main" w="9525">
+                <a14:hiddenLine xmlns:a14="http://schemas.microsoft.com/office/drawing/2010/main" xmlns="" w="9525">
                   <a:solidFill>
                     <a:srgbClr val="000000"/>
                   </a:solidFill>
@@ -895,7 +895,7 @@
             </a:ln>
             <a:extLst>
               <a:ext uri="{91240B29-F687-4f45-9708-019B960494DF}">
-                <a14:hiddenLine xmlns="" xmlns:a14="http://schemas.microsoft.com/office/drawing/2010/main" w="9525">
+                <a14:hiddenLine xmlns:a14="http://schemas.microsoft.com/office/drawing/2010/main" xmlns="" w="9525">
                   <a:solidFill>
                     <a:srgbClr val="000000"/>
                   </a:solidFill>
@@ -957,7 +957,7 @@
             </a:ln>
             <a:extLst>
               <a:ext uri="{91240B29-F687-4f45-9708-019B960494DF}">
-                <a14:hiddenLine xmlns="" xmlns:a14="http://schemas.microsoft.com/office/drawing/2010/main" w="9525">
+                <a14:hiddenLine xmlns:a14="http://schemas.microsoft.com/office/drawing/2010/main" xmlns="" w="9525">
                   <a:solidFill>
                     <a:srgbClr val="000000"/>
                   </a:solidFill>
@@ -1019,7 +1019,7 @@
             </a:ln>
             <a:extLst>
               <a:ext uri="{91240B29-F687-4f45-9708-019B960494DF}">
-                <a14:hiddenLine xmlns="" xmlns:a14="http://schemas.microsoft.com/office/drawing/2010/main" w="9525">
+                <a14:hiddenLine xmlns:a14="http://schemas.microsoft.com/office/drawing/2010/main" xmlns="" w="9525">
                   <a:solidFill>
                     <a:srgbClr val="000000"/>
                   </a:solidFill>
@@ -1109,7 +1109,7 @@
             </a:ln>
             <a:extLst>
               <a:ext uri="{91240B29-F687-4f45-9708-019B960494DF}">
-                <a14:hiddenLine xmlns="" xmlns:a14="http://schemas.microsoft.com/office/drawing/2010/main" w="9525">
+                <a14:hiddenLine xmlns:a14="http://schemas.microsoft.com/office/drawing/2010/main" xmlns="" w="9525">
                   <a:solidFill>
                     <a:srgbClr val="000000"/>
                   </a:solidFill>
@@ -1171,7 +1171,7 @@
             </a:ln>
             <a:extLst>
               <a:ext uri="{91240B29-F687-4f45-9708-019B960494DF}">
-                <a14:hiddenLine xmlns="" xmlns:a14="http://schemas.microsoft.com/office/drawing/2010/main" w="9525">
+                <a14:hiddenLine xmlns:a14="http://schemas.microsoft.com/office/drawing/2010/main" xmlns="" w="9525">
                   <a:solidFill>
                     <a:srgbClr val="000000"/>
                   </a:solidFill>
@@ -1233,7 +1233,7 @@
             </a:ln>
             <a:extLst>
               <a:ext uri="{91240B29-F687-4f45-9708-019B960494DF}">
-                <a14:hiddenLine xmlns="" xmlns:a14="http://schemas.microsoft.com/office/drawing/2010/main" w="9525">
+                <a14:hiddenLine xmlns:a14="http://schemas.microsoft.com/office/drawing/2010/main" xmlns="" w="9525">
                   <a:solidFill>
                     <a:srgbClr val="000000"/>
                   </a:solidFill>
@@ -1323,7 +1323,7 @@
             </a:ln>
             <a:extLst>
               <a:ext uri="{91240B29-F687-4f45-9708-019B960494DF}">
-                <a14:hiddenLine xmlns="" xmlns:a14="http://schemas.microsoft.com/office/drawing/2010/main" w="9525">
+                <a14:hiddenLine xmlns:a14="http://schemas.microsoft.com/office/drawing/2010/main" xmlns="" w="9525">
                   <a:solidFill>
                     <a:srgbClr val="000000"/>
                   </a:solidFill>
@@ -1413,7 +1413,7 @@
             </a:ln>
             <a:extLst>
               <a:ext uri="{91240B29-F687-4f45-9708-019B960494DF}">
-                <a14:hiddenLine xmlns="" xmlns:a14="http://schemas.microsoft.com/office/drawing/2010/main" w="9525">
+                <a14:hiddenLine xmlns:a14="http://schemas.microsoft.com/office/drawing/2010/main" xmlns="" w="9525">
                   <a:solidFill>
                     <a:srgbClr val="000000"/>
                   </a:solidFill>
@@ -1475,7 +1475,7 @@
             </a:ln>
             <a:extLst>
               <a:ext uri="{91240B29-F687-4f45-9708-019B960494DF}">
-                <a14:hiddenLine xmlns="" xmlns:a14="http://schemas.microsoft.com/office/drawing/2010/main" w="9525">
+                <a14:hiddenLine xmlns:a14="http://schemas.microsoft.com/office/drawing/2010/main" xmlns="" w="9525">
                   <a:solidFill>
                     <a:srgbClr val="000000"/>
                   </a:solidFill>
@@ -1585,7 +1585,7 @@
             </a:ln>
             <a:extLst>
               <a:ext uri="{91240B29-F687-4f45-9708-019B960494DF}">
-                <a14:hiddenLine xmlns="" xmlns:a14="http://schemas.microsoft.com/office/drawing/2010/main" w="9525">
+                <a14:hiddenLine xmlns:a14="http://schemas.microsoft.com/office/drawing/2010/main" xmlns="" w="9525">
                   <a:solidFill>
                     <a:srgbClr val="000000"/>
                   </a:solidFill>
@@ -1647,7 +1647,7 @@
             </a:ln>
             <a:extLst>
               <a:ext uri="{91240B29-F687-4f45-9708-019B960494DF}">
-                <a14:hiddenLine xmlns="" xmlns:a14="http://schemas.microsoft.com/office/drawing/2010/main" w="9525">
+                <a14:hiddenLine xmlns:a14="http://schemas.microsoft.com/office/drawing/2010/main" xmlns="" w="9525">
                   <a:solidFill>
                     <a:srgbClr val="000000"/>
                   </a:solidFill>
@@ -1737,7 +1737,7 @@
             </a:ln>
             <a:extLst>
               <a:ext uri="{91240B29-F687-4f45-9708-019B960494DF}">
-                <a14:hiddenLine xmlns="" xmlns:a14="http://schemas.microsoft.com/office/drawing/2010/main" w="9525">
+                <a14:hiddenLine xmlns:a14="http://schemas.microsoft.com/office/drawing/2010/main" xmlns="" w="9525">
                   <a:solidFill>
                     <a:srgbClr val="000000"/>
                   </a:solidFill>
@@ -1827,7 +1827,7 @@
             </a:ln>
             <a:extLst>
               <a:ext uri="{91240B29-F687-4f45-9708-019B960494DF}">
-                <a14:hiddenLine xmlns="" xmlns:a14="http://schemas.microsoft.com/office/drawing/2010/main" w="9525">
+                <a14:hiddenLine xmlns:a14="http://schemas.microsoft.com/office/drawing/2010/main" xmlns="" w="9525">
                   <a:solidFill>
                     <a:srgbClr val="000000"/>
                   </a:solidFill>
@@ -1889,7 +1889,7 @@
             </a:ln>
             <a:extLst>
               <a:ext uri="{91240B29-F687-4f45-9708-019B960494DF}">
-                <a14:hiddenLine xmlns="" xmlns:a14="http://schemas.microsoft.com/office/drawing/2010/main" w="9525">
+                <a14:hiddenLine xmlns:a14="http://schemas.microsoft.com/office/drawing/2010/main" xmlns="" w="9525">
                   <a:solidFill>
                     <a:srgbClr val="000000"/>
                   </a:solidFill>
@@ -1979,7 +1979,7 @@
             </a:ln>
             <a:extLst>
               <a:ext uri="{91240B29-F687-4f45-9708-019B960494DF}">
-                <a14:hiddenLine xmlns="" xmlns:a14="http://schemas.microsoft.com/office/drawing/2010/main" w="9525">
+                <a14:hiddenLine xmlns:a14="http://schemas.microsoft.com/office/drawing/2010/main" xmlns="" w="9525">
                   <a:solidFill>
                     <a:srgbClr val="000000"/>
                   </a:solidFill>
@@ -2069,7 +2069,7 @@
             </a:ln>
             <a:extLst>
               <a:ext uri="{91240B29-F687-4f45-9708-019B960494DF}">
-                <a14:hiddenLine xmlns="" xmlns:a14="http://schemas.microsoft.com/office/drawing/2010/main" w="9525">
+                <a14:hiddenLine xmlns:a14="http://schemas.microsoft.com/office/drawing/2010/main" xmlns="" w="9525">
                   <a:solidFill>
                     <a:srgbClr val="000000"/>
                   </a:solidFill>
@@ -2125,7 +2125,7 @@
             </a:ln>
             <a:extLst>
               <a:ext uri="{91240B29-F687-4f45-9708-019B960494DF}">
-                <a14:hiddenLine xmlns="" xmlns:a14="http://schemas.microsoft.com/office/drawing/2010/main" w="9525">
+                <a14:hiddenLine xmlns:a14="http://schemas.microsoft.com/office/drawing/2010/main" xmlns="" w="9525">
                   <a:solidFill>
                     <a:srgbClr val="000000"/>
                   </a:solidFill>
@@ -2215,7 +2215,7 @@
             </a:ln>
             <a:extLst>
               <a:ext uri="{91240B29-F687-4f45-9708-019B960494DF}">
-                <a14:hiddenLine xmlns="" xmlns:a14="http://schemas.microsoft.com/office/drawing/2010/main" w="9525">
+                <a14:hiddenLine xmlns:a14="http://schemas.microsoft.com/office/drawing/2010/main" xmlns="" w="9525">
                   <a:solidFill>
                     <a:srgbClr val="000000"/>
                   </a:solidFill>
@@ -2271,7 +2271,7 @@
             </a:ln>
             <a:extLst>
               <a:ext uri="{91240B29-F687-4f45-9708-019B960494DF}">
-                <a14:hiddenLine xmlns="" xmlns:a14="http://schemas.microsoft.com/office/drawing/2010/main" w="9525">
+                <a14:hiddenLine xmlns:a14="http://schemas.microsoft.com/office/drawing/2010/main" xmlns="" w="9525">
                   <a:solidFill>
                     <a:srgbClr val="000000"/>
                   </a:solidFill>
@@ -2361,7 +2361,7 @@
             </a:ln>
             <a:extLst>
               <a:ext uri="{91240B29-F687-4f45-9708-019B960494DF}">
-                <a14:hiddenLine xmlns="" xmlns:a14="http://schemas.microsoft.com/office/drawing/2010/main" w="9525">
+                <a14:hiddenLine xmlns:a14="http://schemas.microsoft.com/office/drawing/2010/main" xmlns="" w="9525">
                   <a:solidFill>
                     <a:srgbClr val="000000"/>
                   </a:solidFill>
@@ -2429,7 +2429,7 @@
             </a:ln>
             <a:extLst>
               <a:ext uri="{91240B29-F687-4f45-9708-019B960494DF}">
-                <a14:hiddenLine xmlns="" xmlns:a14="http://schemas.microsoft.com/office/drawing/2010/main" w="9525">
+                <a14:hiddenLine xmlns:a14="http://schemas.microsoft.com/office/drawing/2010/main" xmlns="" w="9525">
                   <a:solidFill>
                     <a:srgbClr val="000000"/>
                   </a:solidFill>
@@ -2519,7 +2519,7 @@
             </a:ln>
             <a:extLst>
               <a:ext uri="{91240B29-F687-4f45-9708-019B960494DF}">
-                <a14:hiddenLine xmlns="" xmlns:a14="http://schemas.microsoft.com/office/drawing/2010/main" w="9525">
+                <a14:hiddenLine xmlns:a14="http://schemas.microsoft.com/office/drawing/2010/main" xmlns="" w="9525">
                   <a:solidFill>
                     <a:srgbClr val="000000"/>
                   </a:solidFill>
@@ -2587,7 +2587,7 @@
             </a:ln>
             <a:extLst>
               <a:ext uri="{91240B29-F687-4f45-9708-019B960494DF}">
-                <a14:hiddenLine xmlns="" xmlns:a14="http://schemas.microsoft.com/office/drawing/2010/main" w="9525">
+                <a14:hiddenLine xmlns:a14="http://schemas.microsoft.com/office/drawing/2010/main" xmlns="" w="9525">
                   <a:solidFill>
                     <a:srgbClr val="000000"/>
                   </a:solidFill>
@@ -2677,7 +2677,7 @@
             </a:ln>
             <a:extLst>
               <a:ext uri="{91240B29-F687-4f45-9708-019B960494DF}">
-                <a14:hiddenLine xmlns="" xmlns:a14="http://schemas.microsoft.com/office/drawing/2010/main" w="9525">
+                <a14:hiddenLine xmlns:a14="http://schemas.microsoft.com/office/drawing/2010/main" xmlns="" w="9525">
                   <a:solidFill>
                     <a:srgbClr val="000000"/>
                   </a:solidFill>
@@ -2711,7 +2711,7 @@
             </a:ln>
             <a:extLst>
               <a:ext uri="{91240B29-F687-4f45-9708-019B960494DF}">
-                <a14:hiddenLine xmlns="" xmlns:a14="http://schemas.microsoft.com/office/drawing/2010/main" w="9525">
+                <a14:hiddenLine xmlns:a14="http://schemas.microsoft.com/office/drawing/2010/main" xmlns="" w="9525">
                   <a:solidFill>
                     <a:srgbClr val="000000"/>
                   </a:solidFill>
@@ -2801,7 +2801,7 @@
             </a:ln>
             <a:extLst>
               <a:ext uri="{91240B29-F687-4f45-9708-019B960494DF}">
-                <a14:hiddenLine xmlns="" xmlns:a14="http://schemas.microsoft.com/office/drawing/2010/main" w="9525">
+                <a14:hiddenLine xmlns:a14="http://schemas.microsoft.com/office/drawing/2010/main" xmlns="" w="9525">
                   <a:solidFill>
                     <a:srgbClr val="000000"/>
                   </a:solidFill>
@@ -2863,7 +2863,7 @@
             </a:ln>
             <a:extLst>
               <a:ext uri="{91240B29-F687-4f45-9708-019B960494DF}">
-                <a14:hiddenLine xmlns="" xmlns:a14="http://schemas.microsoft.com/office/drawing/2010/main" w="9525">
+                <a14:hiddenLine xmlns:a14="http://schemas.microsoft.com/office/drawing/2010/main" xmlns="" w="9525">
                   <a:solidFill>
                     <a:srgbClr val="000000"/>
                   </a:solidFill>
@@ -2925,7 +2925,7 @@
             </a:ln>
             <a:extLst>
               <a:ext uri="{91240B29-F687-4f45-9708-019B960494DF}">
-                <a14:hiddenLine xmlns="" xmlns:a14="http://schemas.microsoft.com/office/drawing/2010/main" w="9525">
+                <a14:hiddenLine xmlns:a14="http://schemas.microsoft.com/office/drawing/2010/main" xmlns="" w="9525">
                   <a:solidFill>
                     <a:srgbClr val="000000"/>
                   </a:solidFill>
@@ -3015,7 +3015,7 @@
             </a:ln>
             <a:extLst>
               <a:ext uri="{91240B29-F687-4f45-9708-019B960494DF}">
-                <a14:hiddenLine xmlns="" xmlns:a14="http://schemas.microsoft.com/office/drawing/2010/main" w="9525">
+                <a14:hiddenLine xmlns:a14="http://schemas.microsoft.com/office/drawing/2010/main" xmlns="" w="9525">
                   <a:solidFill>
                     <a:srgbClr val="000000"/>
                   </a:solidFill>
@@ -3083,7 +3083,7 @@
             </a:ln>
             <a:extLst>
               <a:ext uri="{91240B29-F687-4f45-9708-019B960494DF}">
-                <a14:hiddenLine xmlns="" xmlns:a14="http://schemas.microsoft.com/office/drawing/2010/main" w="9525">
+                <a14:hiddenLine xmlns:a14="http://schemas.microsoft.com/office/drawing/2010/main" xmlns="" w="9525">
                   <a:solidFill>
                     <a:srgbClr val="000000"/>
                   </a:solidFill>
@@ -3145,7 +3145,7 @@
             </a:ln>
             <a:extLst>
               <a:ext uri="{91240B29-F687-4f45-9708-019B960494DF}">
-                <a14:hiddenLine xmlns="" xmlns:a14="http://schemas.microsoft.com/office/drawing/2010/main" w="9525">
+                <a14:hiddenLine xmlns:a14="http://schemas.microsoft.com/office/drawing/2010/main" xmlns="" w="9525">
                   <a:solidFill>
                     <a:srgbClr val="000000"/>
                   </a:solidFill>
@@ -3235,7 +3235,7 @@
             </a:ln>
             <a:extLst>
               <a:ext uri="{91240B29-F687-4f45-9708-019B960494DF}">
-                <a14:hiddenLine xmlns="" xmlns:a14="http://schemas.microsoft.com/office/drawing/2010/main" w="9525">
+                <a14:hiddenLine xmlns:a14="http://schemas.microsoft.com/office/drawing/2010/main" xmlns="" w="9525">
                   <a:solidFill>
                     <a:srgbClr val="000000"/>
                   </a:solidFill>
@@ -3297,7 +3297,7 @@
             </a:ln>
             <a:extLst>
               <a:ext uri="{91240B29-F687-4f45-9708-019B960494DF}">
-                <a14:hiddenLine xmlns="" xmlns:a14="http://schemas.microsoft.com/office/drawing/2010/main" w="9525">
+                <a14:hiddenLine xmlns:a14="http://schemas.microsoft.com/office/drawing/2010/main" xmlns="" w="9525">
                   <a:solidFill>
                     <a:srgbClr val="000000"/>
                   </a:solidFill>
@@ -3387,7 +3387,7 @@
             </a:ln>
             <a:extLst>
               <a:ext uri="{91240B29-F687-4f45-9708-019B960494DF}">
-                <a14:hiddenLine xmlns="" xmlns:a14="http://schemas.microsoft.com/office/drawing/2010/main" w="9525">
+                <a14:hiddenLine xmlns:a14="http://schemas.microsoft.com/office/drawing/2010/main" xmlns="" w="9525">
                   <a:solidFill>
                     <a:srgbClr val="000000"/>
                   </a:solidFill>
@@ -3449,7 +3449,7 @@
             </a:ln>
             <a:extLst>
               <a:ext uri="{91240B29-F687-4f45-9708-019B960494DF}">
-                <a14:hiddenLine xmlns="" xmlns:a14="http://schemas.microsoft.com/office/drawing/2010/main" w="9525">
+                <a14:hiddenLine xmlns:a14="http://schemas.microsoft.com/office/drawing/2010/main" xmlns="" w="9525">
                   <a:solidFill>
                     <a:srgbClr val="000000"/>
                   </a:solidFill>
@@ -3539,7 +3539,7 @@
             </a:ln>
             <a:extLst>
               <a:ext uri="{91240B29-F687-4f45-9708-019B960494DF}">
-                <a14:hiddenLine xmlns="" xmlns:a14="http://schemas.microsoft.com/office/drawing/2010/main" w="9525">
+                <a14:hiddenLine xmlns:a14="http://schemas.microsoft.com/office/drawing/2010/main" xmlns="" w="9525">
                   <a:solidFill>
                     <a:srgbClr val="000000"/>
                   </a:solidFill>
@@ -3573,7 +3573,7 @@
             </a:ln>
             <a:extLst>
               <a:ext uri="{91240B29-F687-4f45-9708-019B960494DF}">
-                <a14:hiddenLine xmlns="" xmlns:a14="http://schemas.microsoft.com/office/drawing/2010/main" w="9525">
+                <a14:hiddenLine xmlns:a14="http://schemas.microsoft.com/office/drawing/2010/main" xmlns="" w="9525">
                   <a:solidFill>
                     <a:srgbClr val="000000"/>
                   </a:solidFill>
@@ -3638,7 +3638,7 @@
             </a:ln>
             <a:extLst>
               <a:ext uri="{91240B29-F687-4f45-9708-019B960494DF}">
-                <a14:hiddenLine xmlns="" xmlns:a14="http://schemas.microsoft.com/office/drawing/2010/main" w="9525">
+                <a14:hiddenLine xmlns:a14="http://schemas.microsoft.com/office/drawing/2010/main" xmlns="" w="9525">
                   <a:solidFill>
                     <a:srgbClr val="000000"/>
                   </a:solidFill>
@@ -3728,7 +3728,7 @@
             </a:ln>
             <a:extLst>
               <a:ext uri="{91240B29-F687-4f45-9708-019B960494DF}">
-                <a14:hiddenLine xmlns="" xmlns:a14="http://schemas.microsoft.com/office/drawing/2010/main" w="9525">
+                <a14:hiddenLine xmlns:a14="http://schemas.microsoft.com/office/drawing/2010/main" xmlns="" w="9525">
                   <a:solidFill>
                     <a:srgbClr val="000000"/>
                   </a:solidFill>
@@ -3790,7 +3790,7 @@
             </a:ln>
             <a:extLst>
               <a:ext uri="{91240B29-F687-4f45-9708-019B960494DF}">
-                <a14:hiddenLine xmlns="" xmlns:a14="http://schemas.microsoft.com/office/drawing/2010/main" w="9525">
+                <a14:hiddenLine xmlns:a14="http://schemas.microsoft.com/office/drawing/2010/main" xmlns="" w="9525">
                   <a:solidFill>
                     <a:srgbClr val="000000"/>
                   </a:solidFill>
@@ -3880,7 +3880,7 @@
             </a:ln>
             <a:extLst>
               <a:ext uri="{91240B29-F687-4f45-9708-019B960494DF}">
-                <a14:hiddenLine xmlns="" xmlns:a14="http://schemas.microsoft.com/office/drawing/2010/main" w="9525">
+                <a14:hiddenLine xmlns:a14="http://schemas.microsoft.com/office/drawing/2010/main" xmlns="" w="9525">
                   <a:solidFill>
                     <a:srgbClr val="000000"/>
                   </a:solidFill>
@@ -3970,7 +3970,7 @@
             </a:ln>
             <a:extLst>
               <a:ext uri="{91240B29-F687-4f45-9708-019B960494DF}">
-                <a14:hiddenLine xmlns="" xmlns:a14="http://schemas.microsoft.com/office/drawing/2010/main" w="9525">
+                <a14:hiddenLine xmlns:a14="http://schemas.microsoft.com/office/drawing/2010/main" xmlns="" w="9525">
                   <a:solidFill>
                     <a:srgbClr val="000000"/>
                   </a:solidFill>
@@ -4035,7 +4035,7 @@
             </a:ln>
             <a:extLst>
               <a:ext uri="{91240B29-F687-4f45-9708-019B960494DF}">
-                <a14:hiddenLine xmlns="" xmlns:a14="http://schemas.microsoft.com/office/drawing/2010/main" w="9525">
+                <a14:hiddenLine xmlns:a14="http://schemas.microsoft.com/office/drawing/2010/main" xmlns="" w="9525">
                   <a:solidFill>
                     <a:srgbClr val="000000"/>
                   </a:solidFill>
@@ -4097,7 +4097,7 @@
             </a:ln>
             <a:extLst>
               <a:ext uri="{91240B29-F687-4f45-9708-019B960494DF}">
-                <a14:hiddenLine xmlns="" xmlns:a14="http://schemas.microsoft.com/office/drawing/2010/main" w="9525">
+                <a14:hiddenLine xmlns:a14="http://schemas.microsoft.com/office/drawing/2010/main" xmlns="" w="9525">
                   <a:solidFill>
                     <a:srgbClr val="000000"/>
                   </a:solidFill>
@@ -4187,7 +4187,7 @@
             </a:ln>
             <a:extLst>
               <a:ext uri="{91240B29-F687-4f45-9708-019B960494DF}">
-                <a14:hiddenLine xmlns="" xmlns:a14="http://schemas.microsoft.com/office/drawing/2010/main" w="9525">
+                <a14:hiddenLine xmlns:a14="http://schemas.microsoft.com/office/drawing/2010/main" xmlns="" w="9525">
                   <a:solidFill>
                     <a:srgbClr val="000000"/>
                   </a:solidFill>
@@ -4277,7 +4277,7 @@
             </a:ln>
             <a:extLst>
               <a:ext uri="{91240B29-F687-4f45-9708-019B960494DF}">
-                <a14:hiddenLine xmlns="" xmlns:a14="http://schemas.microsoft.com/office/drawing/2010/main" w="9525">
+                <a14:hiddenLine xmlns:a14="http://schemas.microsoft.com/office/drawing/2010/main" xmlns="" w="9525">
                   <a:solidFill>
                     <a:srgbClr val="000000"/>
                   </a:solidFill>
@@ -4339,7 +4339,7 @@
             </a:ln>
             <a:extLst>
               <a:ext uri="{91240B29-F687-4f45-9708-019B960494DF}">
-                <a14:hiddenLine xmlns="" xmlns:a14="http://schemas.microsoft.com/office/drawing/2010/main" w="9525">
+                <a14:hiddenLine xmlns:a14="http://schemas.microsoft.com/office/drawing/2010/main" xmlns="" w="9525">
                   <a:solidFill>
                     <a:srgbClr val="000000"/>
                   </a:solidFill>
@@ -4459,7 +4459,7 @@
             </a:ln>
             <a:extLst>
               <a:ext uri="{91240B29-F687-4f45-9708-019B960494DF}">
-                <a14:hiddenLine xmlns="" xmlns:a14="http://schemas.microsoft.com/office/drawing/2010/main" w="9525">
+                <a14:hiddenLine xmlns:a14="http://schemas.microsoft.com/office/drawing/2010/main" xmlns="" w="9525">
                   <a:solidFill>
                     <a:srgbClr val="000000"/>
                   </a:solidFill>
@@ -4527,7 +4527,7 @@
             </a:ln>
             <a:extLst>
               <a:ext uri="{91240B29-F687-4f45-9708-019B960494DF}">
-                <a14:hiddenLine xmlns="" xmlns:a14="http://schemas.microsoft.com/office/drawing/2010/main" w="9525">
+                <a14:hiddenLine xmlns:a14="http://schemas.microsoft.com/office/drawing/2010/main" xmlns="" w="9525">
                   <a:solidFill>
                     <a:srgbClr val="000000"/>
                   </a:solidFill>
@@ -4617,7 +4617,7 @@
             </a:ln>
             <a:extLst>
               <a:ext uri="{91240B29-F687-4f45-9708-019B960494DF}">
-                <a14:hiddenLine xmlns="" xmlns:a14="http://schemas.microsoft.com/office/drawing/2010/main" w="9525">
+                <a14:hiddenLine xmlns:a14="http://schemas.microsoft.com/office/drawing/2010/main" xmlns="" w="9525">
                   <a:solidFill>
                     <a:srgbClr val="000000"/>
                   </a:solidFill>
@@ -4757,7 +4757,7 @@
           <a:p>
             <a:fld id="{348D1148-AA36-4684-835C-5806DCFCF7AA}" type="datetimeFigureOut">
               <a:rPr lang="ru-RU" smtClean="0"/>
-              <a:t>06.02.2022</a:t>
+              <a:t>07.02.2022</a:t>
             </a:fld>
             <a:endParaRPr lang="ru-RU"/>
           </a:p>
@@ -5024,7 +5024,7 @@
           <a:p>
             <a:fld id="{348D1148-AA36-4684-835C-5806DCFCF7AA}" type="datetimeFigureOut">
               <a:rPr lang="ru-RU" smtClean="0"/>
-              <a:t>06.02.2022</a:t>
+              <a:t>07.02.2022</a:t>
             </a:fld>
             <a:endParaRPr lang="ru-RU"/>
           </a:p>
@@ -5220,7 +5220,7 @@
           <a:p>
             <a:fld id="{348D1148-AA36-4684-835C-5806DCFCF7AA}" type="datetimeFigureOut">
               <a:rPr lang="ru-RU" smtClean="0"/>
-              <a:t>06.02.2022</a:t>
+              <a:t>07.02.2022</a:t>
             </a:fld>
             <a:endParaRPr lang="ru-RU"/>
           </a:p>
@@ -5483,7 +5483,7 @@
           <a:p>
             <a:fld id="{348D1148-AA36-4684-835C-5806DCFCF7AA}" type="datetimeFigureOut">
               <a:rPr lang="ru-RU" smtClean="0"/>
-              <a:t>06.02.2022</a:t>
+              <a:t>07.02.2022</a:t>
             </a:fld>
             <a:endParaRPr lang="ru-RU"/>
           </a:p>
@@ -5917,7 +5917,7 @@
           <a:p>
             <a:fld id="{348D1148-AA36-4684-835C-5806DCFCF7AA}" type="datetimeFigureOut">
               <a:rPr lang="ru-RU" smtClean="0"/>
-              <a:t>06.02.2022</a:t>
+              <a:t>07.02.2022</a:t>
             </a:fld>
             <a:endParaRPr lang="ru-RU"/>
           </a:p>
@@ -6463,7 +6463,7 @@
           <a:p>
             <a:fld id="{348D1148-AA36-4684-835C-5806DCFCF7AA}" type="datetimeFigureOut">
               <a:rPr lang="ru-RU" smtClean="0"/>
-              <a:t>06.02.2022</a:t>
+              <a:t>07.02.2022</a:t>
             </a:fld>
             <a:endParaRPr lang="ru-RU"/>
           </a:p>
@@ -7183,7 +7183,7 @@
           <a:p>
             <a:fld id="{348D1148-AA36-4684-835C-5806DCFCF7AA}" type="datetimeFigureOut">
               <a:rPr lang="ru-RU" smtClean="0"/>
-              <a:t>06.02.2022</a:t>
+              <a:t>07.02.2022</a:t>
             </a:fld>
             <a:endParaRPr lang="ru-RU"/>
           </a:p>
@@ -7353,7 +7353,7 @@
           <a:p>
             <a:fld id="{348D1148-AA36-4684-835C-5806DCFCF7AA}" type="datetimeFigureOut">
               <a:rPr lang="ru-RU" smtClean="0"/>
-              <a:t>06.02.2022</a:t>
+              <a:t>07.02.2022</a:t>
             </a:fld>
             <a:endParaRPr lang="ru-RU"/>
           </a:p>
@@ -7533,7 +7533,7 @@
           <a:p>
             <a:fld id="{348D1148-AA36-4684-835C-5806DCFCF7AA}" type="datetimeFigureOut">
               <a:rPr lang="ru-RU" smtClean="0"/>
-              <a:t>06.02.2022</a:t>
+              <a:t>07.02.2022</a:t>
             </a:fld>
             <a:endParaRPr lang="ru-RU"/>
           </a:p>
@@ -7703,7 +7703,7 @@
           <a:p>
             <a:fld id="{348D1148-AA36-4684-835C-5806DCFCF7AA}" type="datetimeFigureOut">
               <a:rPr lang="ru-RU" smtClean="0"/>
-              <a:t>06.02.2022</a:t>
+              <a:t>07.02.2022</a:t>
             </a:fld>
             <a:endParaRPr lang="ru-RU"/>
           </a:p>
@@ -7953,7 +7953,7 @@
           <a:p>
             <a:fld id="{348D1148-AA36-4684-835C-5806DCFCF7AA}" type="datetimeFigureOut">
               <a:rPr lang="ru-RU" smtClean="0"/>
-              <a:t>06.02.2022</a:t>
+              <a:t>07.02.2022</a:t>
             </a:fld>
             <a:endParaRPr lang="ru-RU"/>
           </a:p>
@@ -8185,7 +8185,7 @@
           <a:p>
             <a:fld id="{348D1148-AA36-4684-835C-5806DCFCF7AA}" type="datetimeFigureOut">
               <a:rPr lang="ru-RU" smtClean="0"/>
-              <a:t>06.02.2022</a:t>
+              <a:t>07.02.2022</a:t>
             </a:fld>
             <a:endParaRPr lang="ru-RU"/>
           </a:p>
@@ -8566,7 +8566,7 @@
           <a:p>
             <a:fld id="{348D1148-AA36-4684-835C-5806DCFCF7AA}" type="datetimeFigureOut">
               <a:rPr lang="ru-RU" smtClean="0"/>
-              <a:t>06.02.2022</a:t>
+              <a:t>07.02.2022</a:t>
             </a:fld>
             <a:endParaRPr lang="ru-RU"/>
           </a:p>
@@ -8684,7 +8684,7 @@
           <a:p>
             <a:fld id="{348D1148-AA36-4684-835C-5806DCFCF7AA}" type="datetimeFigureOut">
               <a:rPr lang="ru-RU" smtClean="0"/>
-              <a:t>06.02.2022</a:t>
+              <a:t>07.02.2022</a:t>
             </a:fld>
             <a:endParaRPr lang="ru-RU"/>
           </a:p>
@@ -8779,7 +8779,7 @@
           <a:p>
             <a:fld id="{348D1148-AA36-4684-835C-5806DCFCF7AA}" type="datetimeFigureOut">
               <a:rPr lang="ru-RU" smtClean="0"/>
-              <a:t>06.02.2022</a:t>
+              <a:t>07.02.2022</a:t>
             </a:fld>
             <a:endParaRPr lang="ru-RU"/>
           </a:p>
@@ -9028,7 +9028,7 @@
           <a:p>
             <a:fld id="{348D1148-AA36-4684-835C-5806DCFCF7AA}" type="datetimeFigureOut">
               <a:rPr lang="ru-RU" smtClean="0"/>
-              <a:t>06.02.2022</a:t>
+              <a:t>07.02.2022</a:t>
             </a:fld>
             <a:endParaRPr lang="ru-RU"/>
           </a:p>
@@ -9308,7 +9308,7 @@
           <a:p>
             <a:fld id="{348D1148-AA36-4684-835C-5806DCFCF7AA}" type="datetimeFigureOut">
               <a:rPr lang="ru-RU" smtClean="0"/>
-              <a:t>06.02.2022</a:t>
+              <a:t>07.02.2022</a:t>
             </a:fld>
             <a:endParaRPr lang="ru-RU"/>
           </a:p>
@@ -9431,7 +9431,7 @@
           <a:noFill/>
           <a:extLst>
             <a:ext uri="{909E8E84-426E-40dd-AFC4-6F175D3DCCD1}">
-              <a14:hiddenFill xmlns="" xmlns:a14="http://schemas.microsoft.com/office/drawing/2010/main">
+              <a14:hiddenFill xmlns:a14="http://schemas.microsoft.com/office/drawing/2010/main" xmlns="">
                 <a:solidFill>
                   <a:srgbClr val="FFFFFF"/>
                 </a:solidFill>
@@ -9505,7 +9505,7 @@
               </a:ln>
               <a:extLst>
                 <a:ext uri="{91240B29-F687-4f45-9708-019B960494DF}">
-                  <a14:hiddenLine xmlns="" xmlns:a14="http://schemas.microsoft.com/office/drawing/2010/main" w="9525">
+                  <a14:hiddenLine xmlns:a14="http://schemas.microsoft.com/office/drawing/2010/main" xmlns="" w="9525">
                     <a:solidFill>
                       <a:srgbClr val="000000"/>
                     </a:solidFill>
@@ -9595,7 +9595,7 @@
               </a:ln>
               <a:extLst>
                 <a:ext uri="{91240B29-F687-4f45-9708-019B960494DF}">
-                  <a14:hiddenLine xmlns="" xmlns:a14="http://schemas.microsoft.com/office/drawing/2010/main" w="9525">
+                  <a14:hiddenLine xmlns:a14="http://schemas.microsoft.com/office/drawing/2010/main" xmlns="" w="9525">
                     <a:solidFill>
                       <a:srgbClr val="000000"/>
                     </a:solidFill>
@@ -9685,7 +9685,7 @@
               </a:ln>
               <a:extLst>
                 <a:ext uri="{91240B29-F687-4f45-9708-019B960494DF}">
-                  <a14:hiddenLine xmlns="" xmlns:a14="http://schemas.microsoft.com/office/drawing/2010/main" w="9525">
+                  <a14:hiddenLine xmlns:a14="http://schemas.microsoft.com/office/drawing/2010/main" xmlns="" w="9525">
                     <a:solidFill>
                       <a:srgbClr val="000000"/>
                     </a:solidFill>
@@ -9747,7 +9747,7 @@
               </a:ln>
               <a:extLst>
                 <a:ext uri="{91240B29-F687-4f45-9708-019B960494DF}">
-                  <a14:hiddenLine xmlns="" xmlns:a14="http://schemas.microsoft.com/office/drawing/2010/main" w="9525">
+                  <a14:hiddenLine xmlns:a14="http://schemas.microsoft.com/office/drawing/2010/main" xmlns="" w="9525">
                     <a:solidFill>
                       <a:srgbClr val="000000"/>
                     </a:solidFill>
@@ -9837,7 +9837,7 @@
               </a:ln>
               <a:extLst>
                 <a:ext uri="{91240B29-F687-4f45-9708-019B960494DF}">
-                  <a14:hiddenLine xmlns="" xmlns:a14="http://schemas.microsoft.com/office/drawing/2010/main" w="9525">
+                  <a14:hiddenLine xmlns:a14="http://schemas.microsoft.com/office/drawing/2010/main" xmlns="" w="9525">
                     <a:solidFill>
                       <a:srgbClr val="000000"/>
                     </a:solidFill>
@@ -9899,7 +9899,7 @@
               </a:ln>
               <a:extLst>
                 <a:ext uri="{91240B29-F687-4f45-9708-019B960494DF}">
-                  <a14:hiddenLine xmlns="" xmlns:a14="http://schemas.microsoft.com/office/drawing/2010/main" w="9525">
+                  <a14:hiddenLine xmlns:a14="http://schemas.microsoft.com/office/drawing/2010/main" xmlns="" w="9525">
                     <a:solidFill>
                       <a:srgbClr val="000000"/>
                     </a:solidFill>
@@ -9961,7 +9961,7 @@
               </a:ln>
               <a:extLst>
                 <a:ext uri="{91240B29-F687-4f45-9708-019B960494DF}">
-                  <a14:hiddenLine xmlns="" xmlns:a14="http://schemas.microsoft.com/office/drawing/2010/main" w="9525">
+                  <a14:hiddenLine xmlns:a14="http://schemas.microsoft.com/office/drawing/2010/main" xmlns="" w="9525">
                     <a:solidFill>
                       <a:srgbClr val="000000"/>
                     </a:solidFill>
@@ -10051,7 +10051,7 @@
               </a:ln>
               <a:extLst>
                 <a:ext uri="{91240B29-F687-4f45-9708-019B960494DF}">
-                  <a14:hiddenLine xmlns="" xmlns:a14="http://schemas.microsoft.com/office/drawing/2010/main" w="9525">
+                  <a14:hiddenLine xmlns:a14="http://schemas.microsoft.com/office/drawing/2010/main" xmlns="" w="9525">
                     <a:solidFill>
                       <a:srgbClr val="000000"/>
                     </a:solidFill>
@@ -10141,7 +10141,7 @@
               </a:ln>
               <a:extLst>
                 <a:ext uri="{91240B29-F687-4f45-9708-019B960494DF}">
-                  <a14:hiddenLine xmlns="" xmlns:a14="http://schemas.microsoft.com/office/drawing/2010/main" w="9525">
+                  <a14:hiddenLine xmlns:a14="http://schemas.microsoft.com/office/drawing/2010/main" xmlns="" w="9525">
                     <a:solidFill>
                       <a:srgbClr val="000000"/>
                     </a:solidFill>
@@ -10203,7 +10203,7 @@
               </a:ln>
               <a:extLst>
                 <a:ext uri="{91240B29-F687-4f45-9708-019B960494DF}">
-                  <a14:hiddenLine xmlns="" xmlns:a14="http://schemas.microsoft.com/office/drawing/2010/main" w="9525">
+                  <a14:hiddenLine xmlns:a14="http://schemas.microsoft.com/office/drawing/2010/main" xmlns="" w="9525">
                     <a:solidFill>
                       <a:srgbClr val="000000"/>
                     </a:solidFill>
@@ -10313,7 +10313,7 @@
               </a:ln>
               <a:extLst>
                 <a:ext uri="{91240B29-F687-4f45-9708-019B960494DF}">
-                  <a14:hiddenLine xmlns="" xmlns:a14="http://schemas.microsoft.com/office/drawing/2010/main" w="9525">
+                  <a14:hiddenLine xmlns:a14="http://schemas.microsoft.com/office/drawing/2010/main" xmlns="" w="9525">
                     <a:solidFill>
                       <a:srgbClr val="000000"/>
                     </a:solidFill>
@@ -10397,7 +10397,7 @@
               </a:ln>
               <a:extLst>
                 <a:ext uri="{91240B29-F687-4f45-9708-019B960494DF}">
-                  <a14:hiddenLine xmlns="" xmlns:a14="http://schemas.microsoft.com/office/drawing/2010/main" w="9525">
+                  <a14:hiddenLine xmlns:a14="http://schemas.microsoft.com/office/drawing/2010/main" xmlns="" w="9525">
                     <a:solidFill>
                       <a:srgbClr val="000000"/>
                     </a:solidFill>
@@ -10459,7 +10459,7 @@
               </a:ln>
               <a:extLst>
                 <a:ext uri="{91240B29-F687-4f45-9708-019B960494DF}">
-                  <a14:hiddenLine xmlns="" xmlns:a14="http://schemas.microsoft.com/office/drawing/2010/main" w="9525">
+                  <a14:hiddenLine xmlns:a14="http://schemas.microsoft.com/office/drawing/2010/main" xmlns="" w="9525">
                     <a:solidFill>
                       <a:srgbClr val="000000"/>
                     </a:solidFill>
@@ -10521,7 +10521,7 @@
               </a:ln>
               <a:extLst>
                 <a:ext uri="{91240B29-F687-4f45-9708-019B960494DF}">
-                  <a14:hiddenLine xmlns="" xmlns:a14="http://schemas.microsoft.com/office/drawing/2010/main" w="9525">
+                  <a14:hiddenLine xmlns:a14="http://schemas.microsoft.com/office/drawing/2010/main" xmlns="" w="9525">
                     <a:solidFill>
                       <a:srgbClr val="000000"/>
                     </a:solidFill>
@@ -10611,7 +10611,7 @@
               </a:ln>
               <a:extLst>
                 <a:ext uri="{91240B29-F687-4f45-9708-019B960494DF}">
-                  <a14:hiddenLine xmlns="" xmlns:a14="http://schemas.microsoft.com/office/drawing/2010/main" w="9525">
+                  <a14:hiddenLine xmlns:a14="http://schemas.microsoft.com/office/drawing/2010/main" xmlns="" w="9525">
                     <a:solidFill>
                       <a:srgbClr val="000000"/>
                     </a:solidFill>
@@ -10645,7 +10645,7 @@
               </a:ln>
               <a:extLst>
                 <a:ext uri="{91240B29-F687-4f45-9708-019B960494DF}">
-                  <a14:hiddenLine xmlns="" xmlns:a14="http://schemas.microsoft.com/office/drawing/2010/main" w="9525">
+                  <a14:hiddenLine xmlns:a14="http://schemas.microsoft.com/office/drawing/2010/main" xmlns="" w="9525">
                     <a:solidFill>
                       <a:srgbClr val="000000"/>
                     </a:solidFill>
@@ -10710,7 +10710,7 @@
               </a:ln>
               <a:extLst>
                 <a:ext uri="{91240B29-F687-4f45-9708-019B960494DF}">
-                  <a14:hiddenLine xmlns="" xmlns:a14="http://schemas.microsoft.com/office/drawing/2010/main" w="9525">
+                  <a14:hiddenLine xmlns:a14="http://schemas.microsoft.com/office/drawing/2010/main" xmlns="" w="9525">
                     <a:solidFill>
                       <a:srgbClr val="000000"/>
                     </a:solidFill>
@@ -10800,7 +10800,7 @@
               </a:ln>
               <a:extLst>
                 <a:ext uri="{91240B29-F687-4f45-9708-019B960494DF}">
-                  <a14:hiddenLine xmlns="" xmlns:a14="http://schemas.microsoft.com/office/drawing/2010/main" w="9525">
+                  <a14:hiddenLine xmlns:a14="http://schemas.microsoft.com/office/drawing/2010/main" xmlns="" w="9525">
                     <a:solidFill>
                       <a:srgbClr val="000000"/>
                     </a:solidFill>
@@ -10862,7 +10862,7 @@
               </a:ln>
               <a:extLst>
                 <a:ext uri="{91240B29-F687-4f45-9708-019B960494DF}">
-                  <a14:hiddenLine xmlns="" xmlns:a14="http://schemas.microsoft.com/office/drawing/2010/main" w="9525">
+                  <a14:hiddenLine xmlns:a14="http://schemas.microsoft.com/office/drawing/2010/main" xmlns="" w="9525">
                     <a:solidFill>
                       <a:srgbClr val="000000"/>
                     </a:solidFill>
@@ -10952,7 +10952,7 @@
               </a:ln>
               <a:extLst>
                 <a:ext uri="{91240B29-F687-4f45-9708-019B960494DF}">
-                  <a14:hiddenLine xmlns="" xmlns:a14="http://schemas.microsoft.com/office/drawing/2010/main" w="9525">
+                  <a14:hiddenLine xmlns:a14="http://schemas.microsoft.com/office/drawing/2010/main" xmlns="" w="9525">
                     <a:solidFill>
                       <a:srgbClr val="000000"/>
                     </a:solidFill>
@@ -11017,7 +11017,7 @@
               </a:ln>
               <a:extLst>
                 <a:ext uri="{91240B29-F687-4f45-9708-019B960494DF}">
-                  <a14:hiddenLine xmlns="" xmlns:a14="http://schemas.microsoft.com/office/drawing/2010/main" w="9525">
+                  <a14:hiddenLine xmlns:a14="http://schemas.microsoft.com/office/drawing/2010/main" xmlns="" w="9525">
                     <a:solidFill>
                       <a:srgbClr val="000000"/>
                     </a:solidFill>
@@ -11079,7 +11079,7 @@
               </a:ln>
               <a:extLst>
                 <a:ext uri="{91240B29-F687-4f45-9708-019B960494DF}">
-                  <a14:hiddenLine xmlns="" xmlns:a14="http://schemas.microsoft.com/office/drawing/2010/main" w="9525">
+                  <a14:hiddenLine xmlns:a14="http://schemas.microsoft.com/office/drawing/2010/main" xmlns="" w="9525">
                     <a:solidFill>
                       <a:srgbClr val="000000"/>
                     </a:solidFill>
@@ -11169,7 +11169,7 @@
               </a:ln>
               <a:extLst>
                 <a:ext uri="{91240B29-F687-4f45-9708-019B960494DF}">
-                  <a14:hiddenLine xmlns="" xmlns:a14="http://schemas.microsoft.com/office/drawing/2010/main" w="9525">
+                  <a14:hiddenLine xmlns:a14="http://schemas.microsoft.com/office/drawing/2010/main" xmlns="" w="9525">
                     <a:solidFill>
                       <a:srgbClr val="000000"/>
                     </a:solidFill>
@@ -11259,7 +11259,7 @@
               </a:ln>
               <a:extLst>
                 <a:ext uri="{91240B29-F687-4f45-9708-019B960494DF}">
-                  <a14:hiddenLine xmlns="" xmlns:a14="http://schemas.microsoft.com/office/drawing/2010/main" w="9525">
+                  <a14:hiddenLine xmlns:a14="http://schemas.microsoft.com/office/drawing/2010/main" xmlns="" w="9525">
                     <a:solidFill>
                       <a:srgbClr val="000000"/>
                     </a:solidFill>
@@ -11324,7 +11324,7 @@
               </a:ln>
               <a:extLst>
                 <a:ext uri="{91240B29-F687-4f45-9708-019B960494DF}">
-                  <a14:hiddenLine xmlns="" xmlns:a14="http://schemas.microsoft.com/office/drawing/2010/main" w="9525">
+                  <a14:hiddenLine xmlns:a14="http://schemas.microsoft.com/office/drawing/2010/main" xmlns="" w="9525">
                     <a:solidFill>
                       <a:srgbClr val="000000"/>
                     </a:solidFill>
@@ -11444,7 +11444,7 @@
               </a:ln>
               <a:extLst>
                 <a:ext uri="{91240B29-F687-4f45-9708-019B960494DF}">
-                  <a14:hiddenLine xmlns="" xmlns:a14="http://schemas.microsoft.com/office/drawing/2010/main" w="9525">
+                  <a14:hiddenLine xmlns:a14="http://schemas.microsoft.com/office/drawing/2010/main" xmlns="" w="9525">
                     <a:solidFill>
                       <a:srgbClr val="000000"/>
                     </a:solidFill>
@@ -11525,7 +11525,7 @@
               </a:ln>
               <a:extLst>
                 <a:ext uri="{91240B29-F687-4f45-9708-019B960494DF}">
-                  <a14:hiddenLine xmlns="" xmlns:a14="http://schemas.microsoft.com/office/drawing/2010/main" w="9525">
+                  <a14:hiddenLine xmlns:a14="http://schemas.microsoft.com/office/drawing/2010/main" xmlns="" w="9525">
                     <a:solidFill>
                       <a:srgbClr val="000000"/>
                     </a:solidFill>
@@ -11640,7 +11640,7 @@
               </a:ln>
               <a:extLst>
                 <a:ext uri="{91240B29-F687-4f45-9708-019B960494DF}">
-                  <a14:hiddenLine xmlns="" xmlns:a14="http://schemas.microsoft.com/office/drawing/2010/main" w="9525">
+                  <a14:hiddenLine xmlns:a14="http://schemas.microsoft.com/office/drawing/2010/main" xmlns="" w="9525">
                     <a:solidFill>
                       <a:srgbClr val="000000"/>
                     </a:solidFill>
@@ -11730,7 +11730,7 @@
               </a:ln>
               <a:extLst>
                 <a:ext uri="{91240B29-F687-4f45-9708-019B960494DF}">
-                  <a14:hiddenLine xmlns="" xmlns:a14="http://schemas.microsoft.com/office/drawing/2010/main" w="9525">
+                  <a14:hiddenLine xmlns:a14="http://schemas.microsoft.com/office/drawing/2010/main" xmlns="" w="9525">
                     <a:solidFill>
                       <a:srgbClr val="000000"/>
                     </a:solidFill>
@@ -11795,7 +11795,7 @@
               </a:ln>
               <a:extLst>
                 <a:ext uri="{91240B29-F687-4f45-9708-019B960494DF}">
-                  <a14:hiddenLine xmlns="" xmlns:a14="http://schemas.microsoft.com/office/drawing/2010/main" w="9525">
+                  <a14:hiddenLine xmlns:a14="http://schemas.microsoft.com/office/drawing/2010/main" xmlns="" w="9525">
                     <a:solidFill>
                       <a:srgbClr val="000000"/>
                     </a:solidFill>
@@ -11885,7 +11885,7 @@
               </a:ln>
               <a:extLst>
                 <a:ext uri="{91240B29-F687-4f45-9708-019B960494DF}">
-                  <a14:hiddenLine xmlns="" xmlns:a14="http://schemas.microsoft.com/office/drawing/2010/main" w="9525">
+                  <a14:hiddenLine xmlns:a14="http://schemas.microsoft.com/office/drawing/2010/main" xmlns="" w="9525">
                     <a:solidFill>
                       <a:srgbClr val="000000"/>
                     </a:solidFill>
@@ -11953,7 +11953,7 @@
               </a:ln>
               <a:extLst>
                 <a:ext uri="{91240B29-F687-4f45-9708-019B960494DF}">
-                  <a14:hiddenLine xmlns="" xmlns:a14="http://schemas.microsoft.com/office/drawing/2010/main" w="9525">
+                  <a14:hiddenLine xmlns:a14="http://schemas.microsoft.com/office/drawing/2010/main" xmlns="" w="9525">
                     <a:solidFill>
                       <a:srgbClr val="000000"/>
                     </a:solidFill>
@@ -12043,7 +12043,7 @@
               </a:ln>
               <a:extLst>
                 <a:ext uri="{91240B29-F687-4f45-9708-019B960494DF}">
-                  <a14:hiddenLine xmlns="" xmlns:a14="http://schemas.microsoft.com/office/drawing/2010/main" w="9525">
+                  <a14:hiddenLine xmlns:a14="http://schemas.microsoft.com/office/drawing/2010/main" xmlns="" w="9525">
                     <a:solidFill>
                       <a:srgbClr val="000000"/>
                     </a:solidFill>
@@ -12111,7 +12111,7 @@
               </a:ln>
               <a:extLst>
                 <a:ext uri="{91240B29-F687-4f45-9708-019B960494DF}">
-                  <a14:hiddenLine xmlns="" xmlns:a14="http://schemas.microsoft.com/office/drawing/2010/main" w="9525">
+                  <a14:hiddenLine xmlns:a14="http://schemas.microsoft.com/office/drawing/2010/main" xmlns="" w="9525">
                     <a:solidFill>
                       <a:srgbClr val="000000"/>
                     </a:solidFill>
@@ -12201,7 +12201,7 @@
               </a:ln>
               <a:extLst>
                 <a:ext uri="{91240B29-F687-4f45-9708-019B960494DF}">
-                  <a14:hiddenLine xmlns="" xmlns:a14="http://schemas.microsoft.com/office/drawing/2010/main" w="9525">
+                  <a14:hiddenLine xmlns:a14="http://schemas.microsoft.com/office/drawing/2010/main" xmlns="" w="9525">
                     <a:solidFill>
                       <a:srgbClr val="000000"/>
                     </a:solidFill>
@@ -12235,7 +12235,7 @@
               </a:ln>
               <a:extLst>
                 <a:ext uri="{91240B29-F687-4f45-9708-019B960494DF}">
-                  <a14:hiddenLine xmlns="" xmlns:a14="http://schemas.microsoft.com/office/drawing/2010/main" w="9525">
+                  <a14:hiddenLine xmlns:a14="http://schemas.microsoft.com/office/drawing/2010/main" xmlns="" w="9525">
                     <a:solidFill>
                       <a:srgbClr val="000000"/>
                     </a:solidFill>
@@ -12375,7 +12375,7 @@
           <a:p>
             <a:fld id="{348D1148-AA36-4684-835C-5806DCFCF7AA}" type="datetimeFigureOut">
               <a:rPr lang="ru-RU" smtClean="0"/>
-              <a:t>06.02.2022</a:t>
+              <a:t>07.02.2022</a:t>
             </a:fld>
             <a:endParaRPr lang="ru-RU"/>
           </a:p>
@@ -13784,10 +13784,10 @@
       </p:sp>
       <p:pic>
         <p:nvPicPr>
-          <p:cNvPr id="5" name="Picture 4">
+          <p:cNvPr id="8" name="Picture 7">
             <a:extLst>
               <a:ext uri="{FF2B5EF4-FFF2-40B4-BE49-F238E27FC236}">
-                <a16:creationId xmlns:a16="http://schemas.microsoft.com/office/drawing/2014/main" id="{CB27D9E3-68F1-4D10-BC12-75FE6ED6B31A}"/>
+                <a16:creationId xmlns:a16="http://schemas.microsoft.com/office/drawing/2014/main" id="{B0465835-D4BF-451D-AB6F-3B7FDEA3409D}"/>
               </a:ext>
             </a:extLst>
           </p:cNvPr>
@@ -13810,8 +13810,8 @@
         </p:blipFill>
         <p:spPr>
           <a:xfrm>
-            <a:off x="6467270" y="1388534"/>
-            <a:ext cx="4501203" cy="5019623"/>
+            <a:off x="7141534" y="779306"/>
+            <a:ext cx="3905877" cy="5460175"/>
           </a:xfrm>
           <a:prstGeom prst="rect">
             <a:avLst/>

</xml_diff>